<commit_message>
new pdf and ppt
</commit_message>
<xml_diff>
--- a/StrassenAlg/docu/The Strassen Algorithm_v4.pptx
+++ b/StrassenAlg/docu/The Strassen Algorithm_v4.pptx
@@ -2152,7 +2152,7 @@
           </a:ln>
           <a:extLst>
             <a:ext uri="{C572A759-6A51-4108-AA02-DFA0A04FC94B}">
-              <ma14:wrappingTextBoxFlag xmlns="" xmlns:m="http://schemas.openxmlformats.org/officeDocument/2006/math" xmlns:a14="http://schemas.microsoft.com/office/drawing/2010/main" xmlns:ma14="http://schemas.microsoft.com/office/mac/drawingml/2011/main" val="1"/>
+              <ma14:wrappingTextBoxFlag xmlns:ma14="http://schemas.microsoft.com/office/mac/drawingml/2011/main" xmlns:a14="http://schemas.microsoft.com/office/drawing/2010/main" xmlns:m="http://schemas.openxmlformats.org/officeDocument/2006/math" xmlns="" val="1"/>
             </a:ext>
           </a:extLst>
         </p:spPr>
@@ -2191,7 +2191,7 @@
           </a:ln>
           <a:extLst>
             <a:ext uri="{C572A759-6A51-4108-AA02-DFA0A04FC94B}">
-              <ma14:wrappingTextBoxFlag xmlns="" xmlns:m="http://schemas.openxmlformats.org/officeDocument/2006/math" xmlns:a14="http://schemas.microsoft.com/office/drawing/2010/main" xmlns:ma14="http://schemas.microsoft.com/office/mac/drawingml/2011/main" val="1"/>
+              <ma14:wrappingTextBoxFlag xmlns:ma14="http://schemas.microsoft.com/office/mac/drawingml/2011/main" xmlns:a14="http://schemas.microsoft.com/office/drawing/2010/main" xmlns:m="http://schemas.openxmlformats.org/officeDocument/2006/math" xmlns="" val="1"/>
             </a:ext>
           </a:extLst>
         </p:spPr>
@@ -3205,7 +3205,7 @@
           </a:ln>
           <a:extLst>
             <a:ext uri="{C572A759-6A51-4108-AA02-DFA0A04FC94B}">
-              <ma14:wrappingTextBoxFlag xmlns="" xmlns:m="http://schemas.openxmlformats.org/officeDocument/2006/math" xmlns:a14="http://schemas.microsoft.com/office/drawing/2010/main" xmlns:ma14="http://schemas.microsoft.com/office/mac/drawingml/2011/main" val="1"/>
+              <ma14:wrappingTextBoxFlag xmlns:ma14="http://schemas.microsoft.com/office/mac/drawingml/2011/main" xmlns:a14="http://schemas.microsoft.com/office/drawing/2010/main" xmlns:m="http://schemas.openxmlformats.org/officeDocument/2006/math" xmlns="" val="1"/>
             </a:ext>
           </a:extLst>
         </p:spPr>
@@ -3248,7 +3248,7 @@
           </a:ln>
           <a:extLst>
             <a:ext uri="{C572A759-6A51-4108-AA02-DFA0A04FC94B}">
-              <ma14:wrappingTextBoxFlag xmlns="" xmlns:m="http://schemas.openxmlformats.org/officeDocument/2006/math" xmlns:a14="http://schemas.microsoft.com/office/drawing/2010/main" xmlns:ma14="http://schemas.microsoft.com/office/mac/drawingml/2011/main" val="1"/>
+              <ma14:wrappingTextBoxFlag xmlns:ma14="http://schemas.microsoft.com/office/mac/drawingml/2011/main" xmlns:a14="http://schemas.microsoft.com/office/drawing/2010/main" xmlns:m="http://schemas.openxmlformats.org/officeDocument/2006/math" xmlns="" val="1"/>
             </a:ext>
           </a:extLst>
         </p:spPr>
@@ -3291,7 +3291,7 @@
           </a:ln>
           <a:extLst>
             <a:ext uri="{C572A759-6A51-4108-AA02-DFA0A04FC94B}">
-              <ma14:wrappingTextBoxFlag xmlns="" xmlns:m="http://schemas.openxmlformats.org/officeDocument/2006/math" xmlns:a14="http://schemas.microsoft.com/office/drawing/2010/main" xmlns:ma14="http://schemas.microsoft.com/office/mac/drawingml/2011/main" val="1"/>
+              <ma14:wrappingTextBoxFlag xmlns:ma14="http://schemas.microsoft.com/office/mac/drawingml/2011/main" xmlns:a14="http://schemas.microsoft.com/office/drawing/2010/main" xmlns:m="http://schemas.openxmlformats.org/officeDocument/2006/math" xmlns="" val="1"/>
             </a:ext>
           </a:extLst>
         </p:spPr>
@@ -3469,7 +3469,7 @@
           </a:ln>
           <a:extLst>
             <a:ext uri="{C572A759-6A51-4108-AA02-DFA0A04FC94B}">
-              <ma14:wrappingTextBoxFlag xmlns="" xmlns:m="http://schemas.openxmlformats.org/officeDocument/2006/math" xmlns:a14="http://schemas.microsoft.com/office/drawing/2010/main" xmlns:ma14="http://schemas.microsoft.com/office/mac/drawingml/2011/main" val="1"/>
+              <ma14:wrappingTextBoxFlag xmlns:ma14="http://schemas.microsoft.com/office/mac/drawingml/2011/main" xmlns:a14="http://schemas.microsoft.com/office/drawing/2010/main" xmlns:m="http://schemas.openxmlformats.org/officeDocument/2006/math" xmlns="" val="1"/>
             </a:ext>
           </a:extLst>
         </p:spPr>
@@ -3516,7 +3516,7 @@
           </a:ln>
           <a:extLst>
             <a:ext uri="{C572A759-6A51-4108-AA02-DFA0A04FC94B}">
-              <ma14:wrappingTextBoxFlag xmlns="" xmlns:m="http://schemas.openxmlformats.org/officeDocument/2006/math" xmlns:a14="http://schemas.microsoft.com/office/drawing/2010/main" xmlns:ma14="http://schemas.microsoft.com/office/mac/drawingml/2011/main" val="1"/>
+              <ma14:wrappingTextBoxFlag xmlns:ma14="http://schemas.microsoft.com/office/mac/drawingml/2011/main" xmlns:a14="http://schemas.microsoft.com/office/drawing/2010/main" xmlns:m="http://schemas.openxmlformats.org/officeDocument/2006/math" xmlns="" val="1"/>
             </a:ext>
           </a:extLst>
         </p:spPr>
@@ -3780,7 +3780,7 @@
           </a:ln>
           <a:extLst>
             <a:ext uri="{C572A759-6A51-4108-AA02-DFA0A04FC94B}">
-              <ma14:wrappingTextBoxFlag xmlns="" xmlns:m="http://schemas.openxmlformats.org/officeDocument/2006/math" xmlns:a14="http://schemas.microsoft.com/office/drawing/2010/main" xmlns:ma14="http://schemas.microsoft.com/office/mac/drawingml/2011/main" val="1"/>
+              <ma14:wrappingTextBoxFlag xmlns:ma14="http://schemas.microsoft.com/office/mac/drawingml/2011/main" xmlns:a14="http://schemas.microsoft.com/office/drawing/2010/main" xmlns:m="http://schemas.openxmlformats.org/officeDocument/2006/math" xmlns="" val="1"/>
             </a:ext>
           </a:extLst>
         </p:spPr>
@@ -3823,7 +3823,7 @@
           </a:ln>
           <a:extLst>
             <a:ext uri="{C572A759-6A51-4108-AA02-DFA0A04FC94B}">
-              <ma14:wrappingTextBoxFlag xmlns="" xmlns:m="http://schemas.openxmlformats.org/officeDocument/2006/math" xmlns:a14="http://schemas.microsoft.com/office/drawing/2010/main" xmlns:ma14="http://schemas.microsoft.com/office/mac/drawingml/2011/main" val="1"/>
+              <ma14:wrappingTextBoxFlag xmlns:ma14="http://schemas.microsoft.com/office/mac/drawingml/2011/main" xmlns:a14="http://schemas.microsoft.com/office/drawing/2010/main" xmlns:m="http://schemas.openxmlformats.org/officeDocument/2006/math" xmlns="" val="1"/>
             </a:ext>
           </a:extLst>
         </p:spPr>
@@ -4014,7 +4014,7 @@
           </a:ln>
           <a:extLst>
             <a:ext uri="{C572A759-6A51-4108-AA02-DFA0A04FC94B}">
-              <ma14:wrappingTextBoxFlag xmlns="" xmlns:m="http://schemas.openxmlformats.org/officeDocument/2006/math" xmlns:a14="http://schemas.microsoft.com/office/drawing/2010/main" xmlns:ma14="http://schemas.microsoft.com/office/mac/drawingml/2011/main" val="1"/>
+              <ma14:wrappingTextBoxFlag xmlns:ma14="http://schemas.microsoft.com/office/mac/drawingml/2011/main" xmlns:a14="http://schemas.microsoft.com/office/drawing/2010/main" xmlns:m="http://schemas.openxmlformats.org/officeDocument/2006/math" xmlns="" val="1"/>
             </a:ext>
           </a:extLst>
         </p:spPr>
@@ -4099,7 +4099,7 @@
           </a:ln>
           <a:extLst>
             <a:ext uri="{C572A759-6A51-4108-AA02-DFA0A04FC94B}">
-              <ma14:wrappingTextBoxFlag xmlns="" xmlns:m="http://schemas.openxmlformats.org/officeDocument/2006/math" xmlns:a14="http://schemas.microsoft.com/office/drawing/2010/main" xmlns:ma14="http://schemas.microsoft.com/office/mac/drawingml/2011/main" val="1"/>
+              <ma14:wrappingTextBoxFlag xmlns:ma14="http://schemas.microsoft.com/office/mac/drawingml/2011/main" xmlns:a14="http://schemas.microsoft.com/office/drawing/2010/main" xmlns:m="http://schemas.openxmlformats.org/officeDocument/2006/math" xmlns="" val="1"/>
             </a:ext>
           </a:extLst>
         </p:spPr>
@@ -4184,7 +4184,7 @@
           </a:ln>
           <a:extLst>
             <a:ext uri="{C572A759-6A51-4108-AA02-DFA0A04FC94B}">
-              <ma14:wrappingTextBoxFlag xmlns="" xmlns:m="http://schemas.openxmlformats.org/officeDocument/2006/math" xmlns:a14="http://schemas.microsoft.com/office/drawing/2010/main" xmlns:ma14="http://schemas.microsoft.com/office/mac/drawingml/2011/main" val="1"/>
+              <ma14:wrappingTextBoxFlag xmlns:ma14="http://schemas.microsoft.com/office/mac/drawingml/2011/main" xmlns:a14="http://schemas.microsoft.com/office/drawing/2010/main" xmlns:m="http://schemas.openxmlformats.org/officeDocument/2006/math" xmlns="" val="1"/>
             </a:ext>
           </a:extLst>
         </p:spPr>
@@ -4333,7 +4333,7 @@
           </a:ln>
           <a:extLst>
             <a:ext uri="{C572A759-6A51-4108-AA02-DFA0A04FC94B}">
-              <ma14:wrappingTextBoxFlag xmlns="" xmlns:m="http://schemas.openxmlformats.org/officeDocument/2006/math" xmlns:a14="http://schemas.microsoft.com/office/drawing/2010/main" xmlns:ma14="http://schemas.microsoft.com/office/mac/drawingml/2011/main" val="1"/>
+              <ma14:wrappingTextBoxFlag xmlns:ma14="http://schemas.microsoft.com/office/mac/drawingml/2011/main" xmlns:a14="http://schemas.microsoft.com/office/drawing/2010/main" xmlns:m="http://schemas.openxmlformats.org/officeDocument/2006/math" xmlns="" val="1"/>
             </a:ext>
           </a:extLst>
         </p:spPr>
@@ -4517,7 +4517,7 @@
           </a:ln>
           <a:extLst>
             <a:ext uri="{C572A759-6A51-4108-AA02-DFA0A04FC94B}">
-              <ma14:wrappingTextBoxFlag xmlns="" xmlns:m="http://schemas.openxmlformats.org/officeDocument/2006/math" xmlns:a14="http://schemas.microsoft.com/office/drawing/2010/main" xmlns:ma14="http://schemas.microsoft.com/office/mac/drawingml/2011/main" val="1"/>
+              <ma14:wrappingTextBoxFlag xmlns:ma14="http://schemas.microsoft.com/office/mac/drawingml/2011/main" xmlns:a14="http://schemas.microsoft.com/office/drawing/2010/main" xmlns:m="http://schemas.openxmlformats.org/officeDocument/2006/math" xmlns="" val="1"/>
             </a:ext>
           </a:extLst>
         </p:spPr>
@@ -4697,7 +4697,7 @@
           </a:ln>
           <a:extLst>
             <a:ext uri="{C572A759-6A51-4108-AA02-DFA0A04FC94B}">
-              <ma14:wrappingTextBoxFlag xmlns="" xmlns:m="http://schemas.openxmlformats.org/officeDocument/2006/math" xmlns:a14="http://schemas.microsoft.com/office/drawing/2010/main" xmlns:ma14="http://schemas.microsoft.com/office/mac/drawingml/2011/main" val="1"/>
+              <ma14:wrappingTextBoxFlag xmlns:ma14="http://schemas.microsoft.com/office/mac/drawingml/2011/main" xmlns:a14="http://schemas.microsoft.com/office/drawing/2010/main" xmlns:m="http://schemas.openxmlformats.org/officeDocument/2006/math" xmlns="" val="1"/>
             </a:ext>
           </a:extLst>
         </p:spPr>
@@ -4879,7 +4879,7 @@
           </a:ln>
           <a:extLst>
             <a:ext uri="{C572A759-6A51-4108-AA02-DFA0A04FC94B}">
-              <ma14:wrappingTextBoxFlag xmlns="" xmlns:m="http://schemas.openxmlformats.org/officeDocument/2006/math" xmlns:a14="http://schemas.microsoft.com/office/drawing/2010/main" xmlns:ma14="http://schemas.microsoft.com/office/mac/drawingml/2011/main" val="1"/>
+              <ma14:wrappingTextBoxFlag xmlns:ma14="http://schemas.microsoft.com/office/mac/drawingml/2011/main" xmlns:a14="http://schemas.microsoft.com/office/drawing/2010/main" xmlns:m="http://schemas.openxmlformats.org/officeDocument/2006/math" xmlns="" val="1"/>
             </a:ext>
           </a:extLst>
         </p:spPr>
@@ -5059,7 +5059,7 @@
           </a:ln>
           <a:extLst>
             <a:ext uri="{C572A759-6A51-4108-AA02-DFA0A04FC94B}">
-              <ma14:wrappingTextBoxFlag xmlns="" xmlns:m="http://schemas.openxmlformats.org/officeDocument/2006/math" xmlns:a14="http://schemas.microsoft.com/office/drawing/2010/main" xmlns:ma14="http://schemas.microsoft.com/office/mac/drawingml/2011/main" val="1"/>
+              <ma14:wrappingTextBoxFlag xmlns:ma14="http://schemas.microsoft.com/office/mac/drawingml/2011/main" xmlns:a14="http://schemas.microsoft.com/office/drawing/2010/main" xmlns:m="http://schemas.openxmlformats.org/officeDocument/2006/math" xmlns="" val="1"/>
             </a:ext>
           </a:extLst>
         </p:spPr>
@@ -5805,7 +5805,7 @@
           </a:ln>
           <a:extLst>
             <a:ext uri="{C572A759-6A51-4108-AA02-DFA0A04FC94B}">
-              <ma14:wrappingTextBoxFlag xmlns="" xmlns:m="http://schemas.openxmlformats.org/officeDocument/2006/math" xmlns:a14="http://schemas.microsoft.com/office/drawing/2010/main" xmlns:ma14="http://schemas.microsoft.com/office/mac/drawingml/2011/main" val="1"/>
+              <ma14:wrappingTextBoxFlag xmlns:ma14="http://schemas.microsoft.com/office/mac/drawingml/2011/main" xmlns:a14="http://schemas.microsoft.com/office/drawing/2010/main" xmlns:m="http://schemas.openxmlformats.org/officeDocument/2006/math" xmlns="" val="1"/>
             </a:ext>
           </a:extLst>
         </p:spPr>
@@ -7343,7 +7343,7 @@
           </a:ln>
           <a:extLst>
             <a:ext uri="{C572A759-6A51-4108-AA02-DFA0A04FC94B}">
-              <ma14:wrappingTextBoxFlag xmlns="" xmlns:m="http://schemas.openxmlformats.org/officeDocument/2006/math" xmlns:a14="http://schemas.microsoft.com/office/drawing/2010/main" xmlns:ma14="http://schemas.microsoft.com/office/mac/drawingml/2011/main" val="1"/>
+              <ma14:wrappingTextBoxFlag xmlns:ma14="http://schemas.microsoft.com/office/mac/drawingml/2011/main" xmlns:a14="http://schemas.microsoft.com/office/drawing/2010/main" xmlns:m="http://schemas.openxmlformats.org/officeDocument/2006/math" xmlns="" val="1"/>
             </a:ext>
           </a:extLst>
         </p:spPr>
@@ -7597,33 +7597,6 @@
           <a:chExt cx="0" cy="0"/>
         </a:xfrm>
       </p:grpSpPr>
-      <p:pic>
-        <p:nvPicPr>
-          <p:cNvPr id="190" name="Bild" descr="Bild"/>
-          <p:cNvPicPr>
-            <a:picLocks noChangeAspect="1"/>
-          </p:cNvPicPr>
-          <p:nvPr/>
-        </p:nvPicPr>
-        <p:blipFill>
-          <a:blip r:embed="rId2"/>
-          <a:stretch>
-            <a:fillRect/>
-          </a:stretch>
-        </p:blipFill>
-        <p:spPr>
-          <a:xfrm>
-            <a:off x="953809" y="2623787"/>
-            <a:ext cx="5918200" cy="2717800"/>
-          </a:xfrm>
-          <a:prstGeom prst="rect">
-            <a:avLst/>
-          </a:prstGeom>
-          <a:ln w="12700">
-            <a:miter lim="400000"/>
-          </a:ln>
-        </p:spPr>
-      </p:pic>
       <p:sp>
         <p:nvSpPr>
           <p:cNvPr id="191" name="Textfeld 1"/>
@@ -7643,7 +7616,7 @@
           </a:ln>
           <a:extLst>
             <a:ext uri="{C572A759-6A51-4108-AA02-DFA0A04FC94B}">
-              <ma14:wrappingTextBoxFlag xmlns="" xmlns:m="http://schemas.openxmlformats.org/officeDocument/2006/math" xmlns:a14="http://schemas.microsoft.com/office/drawing/2010/main" xmlns:ma14="http://schemas.microsoft.com/office/mac/drawingml/2011/main" val="1"/>
+              <ma14:wrappingTextBoxFlag xmlns:ma14="http://schemas.microsoft.com/office/mac/drawingml/2011/main" xmlns:a14="http://schemas.microsoft.com/office/drawing/2010/main" xmlns:m="http://schemas.openxmlformats.org/officeDocument/2006/math" xmlns="" val="1"/>
             </a:ext>
           </a:extLst>
         </p:spPr>
@@ -7731,7 +7704,7 @@
           </a:ln>
           <a:extLst>
             <a:ext uri="{C572A759-6A51-4108-AA02-DFA0A04FC94B}">
-              <ma14:wrappingTextBoxFlag xmlns="" xmlns:m="http://schemas.openxmlformats.org/officeDocument/2006/math" xmlns:a14="http://schemas.microsoft.com/office/drawing/2010/main" xmlns:ma14="http://schemas.microsoft.com/office/mac/drawingml/2011/main" val="1"/>
+              <ma14:wrappingTextBoxFlag xmlns:ma14="http://schemas.microsoft.com/office/mac/drawingml/2011/main" xmlns:a14="http://schemas.microsoft.com/office/drawing/2010/main" xmlns:m="http://schemas.openxmlformats.org/officeDocument/2006/math" xmlns="" val="1"/>
             </a:ext>
           </a:extLst>
         </p:spPr>
@@ -7808,6 +7781,36 @@
           <p:nvPr/>
         </p:nvPicPr>
         <p:blipFill>
+          <a:blip r:embed="rId2"/>
+          <a:stretch>
+            <a:fillRect/>
+          </a:stretch>
+        </p:blipFill>
+        <p:spPr>
+          <a:xfrm>
+            <a:off x="7894731" y="2982422"/>
+            <a:ext cx="2896004" cy="2000529"/>
+          </a:xfrm>
+          <a:prstGeom prst="rect">
+            <a:avLst/>
+          </a:prstGeom>
+        </p:spPr>
+      </p:pic>
+      <p:pic>
+        <p:nvPicPr>
+          <p:cNvPr id="3" name="Grafik 2">
+            <a:extLst>
+              <a:ext uri="{FF2B5EF4-FFF2-40B4-BE49-F238E27FC236}">
+                <a16:creationId xmlns:a16="http://schemas.microsoft.com/office/drawing/2014/main" id="{7708FA60-3433-4806-8DC7-D21A6B2898CF}"/>
+              </a:ext>
+            </a:extLst>
+          </p:cNvPr>
+          <p:cNvPicPr>
+            <a:picLocks noChangeAspect="1"/>
+          </p:cNvPicPr>
+          <p:nvPr/>
+        </p:nvPicPr>
+        <p:blipFill>
           <a:blip r:embed="rId3"/>
           <a:stretch>
             <a:fillRect/>
@@ -7815,8 +7818,8 @@
         </p:blipFill>
         <p:spPr>
           <a:xfrm>
-            <a:off x="7894731" y="2982422"/>
-            <a:ext cx="2896004" cy="2000529"/>
+            <a:off x="1015102" y="2795184"/>
+            <a:ext cx="5610191" cy="2577572"/>
           </a:xfrm>
           <a:prstGeom prst="rect">
             <a:avLst/>
@@ -7874,7 +7877,7 @@
           </a:ln>
           <a:extLst>
             <a:ext uri="{C572A759-6A51-4108-AA02-DFA0A04FC94B}">
-              <ma14:wrappingTextBoxFlag xmlns="" xmlns:m="http://schemas.openxmlformats.org/officeDocument/2006/math" xmlns:a14="http://schemas.microsoft.com/office/drawing/2010/main" xmlns:ma14="http://schemas.microsoft.com/office/mac/drawingml/2011/main" val="1"/>
+              <ma14:wrappingTextBoxFlag xmlns:ma14="http://schemas.microsoft.com/office/mac/drawingml/2011/main" xmlns:a14="http://schemas.microsoft.com/office/drawing/2010/main" xmlns:m="http://schemas.openxmlformats.org/officeDocument/2006/math" xmlns="" val="1"/>
             </a:ext>
           </a:extLst>
         </p:spPr>
@@ -7937,7 +7940,7 @@
           </a:ln>
           <a:extLst>
             <a:ext uri="{C572A759-6A51-4108-AA02-DFA0A04FC94B}">
-              <ma14:wrappingTextBoxFlag xmlns="" xmlns:m="http://schemas.openxmlformats.org/officeDocument/2006/math" xmlns:a14="http://schemas.microsoft.com/office/drawing/2010/main" xmlns:ma14="http://schemas.microsoft.com/office/mac/drawingml/2011/main" val="1"/>
+              <ma14:wrappingTextBoxFlag xmlns:ma14="http://schemas.microsoft.com/office/mac/drawingml/2011/main" xmlns:a14="http://schemas.microsoft.com/office/drawing/2010/main" xmlns:m="http://schemas.openxmlformats.org/officeDocument/2006/math" xmlns="" val="1"/>
             </a:ext>
           </a:extLst>
         </p:spPr>
@@ -8013,7 +8016,7 @@
           </a:ln>
           <a:extLst>
             <a:ext uri="{C572A759-6A51-4108-AA02-DFA0A04FC94B}">
-              <ma14:wrappingTextBoxFlag xmlns="" xmlns:m="http://schemas.openxmlformats.org/officeDocument/2006/math" xmlns:a14="http://schemas.microsoft.com/office/drawing/2010/main" xmlns:ma14="http://schemas.microsoft.com/office/mac/drawingml/2011/main" val="1"/>
+              <ma14:wrappingTextBoxFlag xmlns:ma14="http://schemas.microsoft.com/office/mac/drawingml/2011/main" xmlns:a14="http://schemas.microsoft.com/office/drawing/2010/main" xmlns:m="http://schemas.openxmlformats.org/officeDocument/2006/math" xmlns="" val="1"/>
             </a:ext>
           </a:extLst>
         </p:spPr>

</xml_diff>